<commit_message>
Major updates to JMM slides
</commit_message>
<xml_diff>
--- a/JMMPaper/Musical Instrument Classification Using a Hybrid Neural Network BuellShort_KSnotes.pptx
+++ b/JMMPaper/Musical Instrument Classification Using a Hybrid Neural Network BuellShort_KSnotes.pptx
@@ -17370,7 +17370,7 @@
           <a:p>
             <a:fld id="{9E016143-E03C-4CFD-AFDC-14E5BDEA754C}" type="datetimeFigureOut">
               <a:rPr lang="en-US" smtClean="0"/>
-              <a:t>1/3/2021</a:t>
+              <a:t>1/4/2021</a:t>
             </a:fld>
             <a:endParaRPr lang="en-US" dirty="0"/>
           </a:p>
@@ -17599,7 +17599,7 @@
           <a:p>
             <a:fld id="{C033E54A-A8CA-48C1-9504-691B58049D29}" type="datetimeFigureOut">
               <a:rPr lang="en-US" smtClean="0"/>
-              <a:t>1/3/2021</a:t>
+              <a:t>1/4/2021</a:t>
             </a:fld>
             <a:endParaRPr lang="en-US" dirty="0"/>
           </a:p>
@@ -17779,7 +17779,7 @@
           <a:p>
             <a:fld id="{B5F6C806-BBF7-471C-9527-881CE2266695}" type="datetimeFigureOut">
               <a:rPr lang="en-US" smtClean="0"/>
-              <a:t>1/3/2021</a:t>
+              <a:t>1/4/2021</a:t>
             </a:fld>
             <a:endParaRPr lang="en-US" dirty="0"/>
           </a:p>
@@ -17949,7 +17949,7 @@
           <a:p>
             <a:fld id="{78C94063-DF36-4330-A365-08DA1FA5B7D6}" type="datetimeFigureOut">
               <a:rPr lang="en-US" smtClean="0"/>
-              <a:t>1/3/2021</a:t>
+              <a:t>1/4/2021</a:t>
             </a:fld>
             <a:endParaRPr lang="en-US" dirty="0"/>
           </a:p>
@@ -18203,7 +18203,7 @@
           <a:p>
             <a:fld id="{908A7C6C-0F39-4D70-8E8D-FE5B9C95FA73}" type="datetimeFigureOut">
               <a:rPr lang="en-US" smtClean="0"/>
-              <a:t>1/3/2021</a:t>
+              <a:t>1/4/2021</a:t>
             </a:fld>
             <a:endParaRPr lang="en-US" dirty="0"/>
           </a:p>
@@ -18529,7 +18529,7 @@
           <a:p>
             <a:fld id="{DFCFA4AC-08CC-42CE-BD01-C191750A04EC}" type="datetimeFigureOut">
               <a:rPr lang="en-US" smtClean="0"/>
-              <a:t>1/3/2021</a:t>
+              <a:t>1/4/2021</a:t>
             </a:fld>
             <a:endParaRPr lang="en-US" dirty="0"/>
           </a:p>
@@ -18980,7 +18980,7 @@
           <a:p>
             <a:fld id="{1BA7A723-92A7-435B-B681-F25B092FEFEB}" type="datetimeFigureOut">
               <a:rPr lang="en-US" smtClean="0"/>
-              <a:t>1/3/2021</a:t>
+              <a:t>1/4/2021</a:t>
             </a:fld>
             <a:endParaRPr lang="en-US" dirty="0"/>
           </a:p>
@@ -19098,7 +19098,7 @@
           <a:p>
             <a:fld id="{4F170639-886C-4FCF-9EAB-ABB5DA3F3F4A}" type="datetimeFigureOut">
               <a:rPr lang="en-US" smtClean="0"/>
-              <a:t>1/3/2021</a:t>
+              <a:t>1/4/2021</a:t>
             </a:fld>
             <a:endParaRPr lang="en-US" dirty="0"/>
           </a:p>
@@ -19193,7 +19193,7 @@
           <a:p>
             <a:fld id="{22230651-31F4-45D2-98AE-A2108F41BC07}" type="datetimeFigureOut">
               <a:rPr lang="en-US" smtClean="0"/>
-              <a:t>1/3/2021</a:t>
+              <a:t>1/4/2021</a:t>
             </a:fld>
             <a:endParaRPr lang="en-US" dirty="0"/>
           </a:p>
@@ -19480,7 +19480,7 @@
           <a:p>
             <a:fld id="{6F53789A-C914-4DB1-8815-80B5EC7335C5}" type="datetimeFigureOut">
               <a:rPr lang="en-US" smtClean="0"/>
-              <a:t>1/3/2021</a:t>
+              <a:t>1/4/2021</a:t>
             </a:fld>
             <a:endParaRPr lang="en-US" dirty="0"/>
           </a:p>
@@ -19802,7 +19802,7 @@
           <a:p>
             <a:fld id="{5E6440AA-91A0-436F-8FDB-C0F939DCAE21}" type="datetimeFigureOut">
               <a:rPr lang="en-US" smtClean="0"/>
-              <a:t>1/3/2021</a:t>
+              <a:t>1/4/2021</a:t>
             </a:fld>
             <a:endParaRPr lang="en-US" dirty="0"/>
           </a:p>
@@ -20056,7 +20056,7 @@
           <a:p>
             <a:fld id="{0E59FD0C-5451-4CA0-86AF-E70AE3279989}" type="datetimeFigureOut">
               <a:rPr lang="en-US" smtClean="0"/>
-              <a:t>1/3/2021</a:t>
+              <a:t>1/4/2021</a:t>
             </a:fld>
             <a:endParaRPr lang="en-US" dirty="0"/>
           </a:p>
@@ -20621,8 +20621,13 @@
           <a:p>
             <a:r>
               <a:rPr lang="en-US" dirty="0"/>
-              <a:t>Senior, Physics B.S. Major</a:t>
+              <a:t>Senior, B.S. </a:t>
             </a:r>
+            <a:r>
+              <a:rPr lang="en-US"/>
+              <a:t>Physics Major</a:t>
+            </a:r>
+            <a:endParaRPr lang="en-US" dirty="0"/>
           </a:p>
           <a:p>
             <a:r>

</xml_diff>